<commit_message>
course introduction to 2019 fall semester
</commit_message>
<xml_diff>
--- a/Lectures/lec00-course_intro/lec00-course_intro.pptx
+++ b/Lectures/lec00-course_intro/lec00-course_intro.pptx
@@ -360,7 +360,7 @@
                 <a:pPr eaLnBrk="1" hangingPunct="1">
                   <a:defRPr/>
                 </a:pPr>
-                <a:endParaRPr lang="zh-TW" altLang="en-US" smtClean="0"/>
+                <a:endParaRPr lang="zh-TW" altLang="en-US"/>
               </a:p>
             </p:txBody>
           </p:sp>
@@ -520,7 +520,7 @@
                 <a:pPr eaLnBrk="1" hangingPunct="1">
                   <a:defRPr/>
                 </a:pPr>
-                <a:endParaRPr lang="zh-TW" altLang="en-US" smtClean="0"/>
+                <a:endParaRPr lang="zh-TW" altLang="en-US"/>
               </a:p>
             </p:txBody>
           </p:sp>
@@ -689,7 +689,7 @@
                 <a:pPr eaLnBrk="1" hangingPunct="1">
                   <a:defRPr/>
                 </a:pPr>
-                <a:endParaRPr lang="zh-TW" altLang="en-US" smtClean="0"/>
+                <a:endParaRPr lang="zh-TW" altLang="en-US"/>
               </a:p>
             </p:txBody>
           </p:sp>
@@ -849,7 +849,7 @@
                 <a:pPr eaLnBrk="1" hangingPunct="1">
                   <a:defRPr/>
                 </a:pPr>
-                <a:endParaRPr lang="zh-TW" altLang="en-US" smtClean="0"/>
+                <a:endParaRPr lang="zh-TW" altLang="en-US"/>
               </a:p>
             </p:txBody>
           </p:sp>
@@ -1010,7 +1010,7 @@
               <a:pPr eaLnBrk="1" hangingPunct="1">
                 <a:defRPr/>
               </a:pPr>
-              <a:endParaRPr lang="zh-TW" altLang="en-US" smtClean="0"/>
+              <a:endParaRPr lang="zh-TW" altLang="en-US"/>
             </a:p>
           </p:txBody>
         </p:sp>
@@ -1162,7 +1162,7 @@
               <a:pPr eaLnBrk="1" hangingPunct="1">
                 <a:defRPr/>
               </a:pPr>
-              <a:endParaRPr lang="zh-TW" altLang="en-US" smtClean="0"/>
+              <a:endParaRPr lang="zh-TW" altLang="en-US"/>
             </a:p>
           </p:txBody>
         </p:sp>
@@ -1322,7 +1322,7 @@
               <a:pPr eaLnBrk="1" hangingPunct="1">
                 <a:defRPr/>
               </a:pPr>
-              <a:endParaRPr lang="zh-TW" altLang="en-US" smtClean="0"/>
+              <a:endParaRPr lang="zh-TW" altLang="en-US"/>
             </a:p>
           </p:txBody>
         </p:sp>
@@ -1549,10 +1549,9 @@
           <a:lstStyle/>
           <a:p>
             <a:r>
-              <a:rPr lang="zh-TW" altLang="en-US" smtClean="0"/>
+              <a:rPr lang="zh-TW" altLang="en-US"/>
               <a:t>按一下以編輯母片標題樣式</a:t>
             </a:r>
-            <a:endParaRPr lang="zh-TW" altLang="en-US"/>
           </a:p>
         </p:txBody>
       </p:sp>
@@ -1573,38 +1572,37 @@
           <a:p>
             <a:pPr lvl="0"/>
             <a:r>
-              <a:rPr lang="zh-TW" altLang="en-US" smtClean="0"/>
+              <a:rPr lang="zh-TW" altLang="en-US"/>
               <a:t>按一下以編輯母片文字樣式</a:t>
             </a:r>
           </a:p>
           <a:p>
             <a:pPr lvl="1"/>
             <a:r>
-              <a:rPr lang="zh-TW" altLang="en-US" smtClean="0"/>
+              <a:rPr lang="zh-TW" altLang="en-US"/>
               <a:t>第二層</a:t>
             </a:r>
           </a:p>
           <a:p>
             <a:pPr lvl="2"/>
             <a:r>
-              <a:rPr lang="zh-TW" altLang="en-US" smtClean="0"/>
+              <a:rPr lang="zh-TW" altLang="en-US"/>
               <a:t>第三層</a:t>
             </a:r>
           </a:p>
           <a:p>
             <a:pPr lvl="3"/>
             <a:r>
-              <a:rPr lang="zh-TW" altLang="en-US" smtClean="0"/>
+              <a:rPr lang="zh-TW" altLang="en-US"/>
               <a:t>第四層</a:t>
             </a:r>
           </a:p>
           <a:p>
             <a:pPr lvl="4"/>
             <a:r>
-              <a:rPr lang="zh-TW" altLang="en-US" smtClean="0"/>
+              <a:rPr lang="zh-TW" altLang="en-US"/>
               <a:t>第五層</a:t>
             </a:r>
-            <a:endParaRPr lang="zh-TW" altLang="en-US"/>
           </a:p>
         </p:txBody>
       </p:sp>
@@ -1750,10 +1748,9 @@
           <a:lstStyle/>
           <a:p>
             <a:r>
-              <a:rPr lang="zh-TW" altLang="en-US" smtClean="0"/>
+              <a:rPr lang="zh-TW" altLang="en-US"/>
               <a:t>按一下以編輯母片標題樣式</a:t>
             </a:r>
-            <a:endParaRPr lang="zh-TW" altLang="en-US"/>
           </a:p>
         </p:txBody>
       </p:sp>
@@ -1779,38 +1776,37 @@
           <a:p>
             <a:pPr lvl="0"/>
             <a:r>
-              <a:rPr lang="zh-TW" altLang="en-US" smtClean="0"/>
+              <a:rPr lang="zh-TW" altLang="en-US"/>
               <a:t>按一下以編輯母片文字樣式</a:t>
             </a:r>
           </a:p>
           <a:p>
             <a:pPr lvl="1"/>
             <a:r>
-              <a:rPr lang="zh-TW" altLang="en-US" smtClean="0"/>
+              <a:rPr lang="zh-TW" altLang="en-US"/>
               <a:t>第二層</a:t>
             </a:r>
           </a:p>
           <a:p>
             <a:pPr lvl="2"/>
             <a:r>
-              <a:rPr lang="zh-TW" altLang="en-US" smtClean="0"/>
+              <a:rPr lang="zh-TW" altLang="en-US"/>
               <a:t>第三層</a:t>
             </a:r>
           </a:p>
           <a:p>
             <a:pPr lvl="3"/>
             <a:r>
-              <a:rPr lang="zh-TW" altLang="en-US" smtClean="0"/>
+              <a:rPr lang="zh-TW" altLang="en-US"/>
               <a:t>第四層</a:t>
             </a:r>
           </a:p>
           <a:p>
             <a:pPr lvl="4"/>
             <a:r>
-              <a:rPr lang="zh-TW" altLang="en-US" smtClean="0"/>
+              <a:rPr lang="zh-TW" altLang="en-US"/>
               <a:t>第五層</a:t>
             </a:r>
-            <a:endParaRPr lang="zh-TW" altLang="en-US"/>
           </a:p>
         </p:txBody>
       </p:sp>
@@ -1951,10 +1947,9 @@
           <a:lstStyle/>
           <a:p>
             <a:r>
-              <a:rPr lang="zh-TW" altLang="en-US" smtClean="0"/>
+              <a:rPr lang="zh-TW" altLang="en-US"/>
               <a:t>按一下以編輯母片標題樣式</a:t>
             </a:r>
-            <a:endParaRPr lang="zh-TW" altLang="en-US"/>
           </a:p>
         </p:txBody>
       </p:sp>
@@ -1975,38 +1970,37 @@
           <a:p>
             <a:pPr lvl="0"/>
             <a:r>
-              <a:rPr lang="zh-TW" altLang="en-US" smtClean="0"/>
+              <a:rPr lang="zh-TW" altLang="en-US"/>
               <a:t>按一下以編輯母片文字樣式</a:t>
             </a:r>
           </a:p>
           <a:p>
             <a:pPr lvl="1"/>
             <a:r>
-              <a:rPr lang="zh-TW" altLang="en-US" smtClean="0"/>
+              <a:rPr lang="zh-TW" altLang="en-US"/>
               <a:t>第二層</a:t>
             </a:r>
           </a:p>
           <a:p>
             <a:pPr lvl="2"/>
             <a:r>
-              <a:rPr lang="zh-TW" altLang="en-US" smtClean="0"/>
+              <a:rPr lang="zh-TW" altLang="en-US"/>
               <a:t>第三層</a:t>
             </a:r>
           </a:p>
           <a:p>
             <a:pPr lvl="3"/>
             <a:r>
-              <a:rPr lang="zh-TW" altLang="en-US" smtClean="0"/>
+              <a:rPr lang="zh-TW" altLang="en-US"/>
               <a:t>第四層</a:t>
             </a:r>
           </a:p>
           <a:p>
             <a:pPr lvl="4"/>
             <a:r>
-              <a:rPr lang="zh-TW" altLang="en-US" smtClean="0"/>
+              <a:rPr lang="zh-TW" altLang="en-US"/>
               <a:t>第五層</a:t>
             </a:r>
-            <a:endParaRPr lang="zh-TW" altLang="en-US"/>
           </a:p>
         </p:txBody>
       </p:sp>
@@ -2156,10 +2150,9 @@
           </a:lstStyle>
           <a:p>
             <a:r>
-              <a:rPr lang="zh-TW" altLang="en-US" smtClean="0"/>
+              <a:rPr lang="zh-TW" altLang="en-US"/>
               <a:t>按一下以編輯母片標題樣式</a:t>
             </a:r>
-            <a:endParaRPr lang="zh-TW" altLang="en-US"/>
           </a:p>
         </p:txBody>
       </p:sp>
@@ -2222,7 +2215,7 @@
           <a:p>
             <a:pPr lvl="0"/>
             <a:r>
-              <a:rPr lang="zh-TW" altLang="en-US" smtClean="0"/>
+              <a:rPr lang="zh-TW" altLang="en-US"/>
               <a:t>按一下以編輯母片文字樣式</a:t>
             </a:r>
           </a:p>
@@ -2365,10 +2358,9 @@
           <a:lstStyle/>
           <a:p>
             <a:r>
-              <a:rPr lang="zh-TW" altLang="en-US" smtClean="0"/>
+              <a:rPr lang="zh-TW" altLang="en-US"/>
               <a:t>按一下以編輯母片標題樣式</a:t>
             </a:r>
-            <a:endParaRPr lang="zh-TW" altLang="en-US"/>
           </a:p>
         </p:txBody>
       </p:sp>
@@ -2422,38 +2414,37 @@
           <a:p>
             <a:pPr lvl="0"/>
             <a:r>
-              <a:rPr lang="zh-TW" altLang="en-US" smtClean="0"/>
+              <a:rPr lang="zh-TW" altLang="en-US"/>
               <a:t>按一下以編輯母片文字樣式</a:t>
             </a:r>
           </a:p>
           <a:p>
             <a:pPr lvl="1"/>
             <a:r>
-              <a:rPr lang="zh-TW" altLang="en-US" smtClean="0"/>
+              <a:rPr lang="zh-TW" altLang="en-US"/>
               <a:t>第二層</a:t>
             </a:r>
           </a:p>
           <a:p>
             <a:pPr lvl="2"/>
             <a:r>
-              <a:rPr lang="zh-TW" altLang="en-US" smtClean="0"/>
+              <a:rPr lang="zh-TW" altLang="en-US"/>
               <a:t>第三層</a:t>
             </a:r>
           </a:p>
           <a:p>
             <a:pPr lvl="3"/>
             <a:r>
-              <a:rPr lang="zh-TW" altLang="en-US" smtClean="0"/>
+              <a:rPr lang="zh-TW" altLang="en-US"/>
               <a:t>第四層</a:t>
             </a:r>
           </a:p>
           <a:p>
             <a:pPr lvl="4"/>
             <a:r>
-              <a:rPr lang="zh-TW" altLang="en-US" smtClean="0"/>
+              <a:rPr lang="zh-TW" altLang="en-US"/>
               <a:t>第五層</a:t>
             </a:r>
-            <a:endParaRPr lang="zh-TW" altLang="en-US"/>
           </a:p>
         </p:txBody>
       </p:sp>
@@ -2507,38 +2498,37 @@
           <a:p>
             <a:pPr lvl="0"/>
             <a:r>
-              <a:rPr lang="zh-TW" altLang="en-US" smtClean="0"/>
+              <a:rPr lang="zh-TW" altLang="en-US"/>
               <a:t>按一下以編輯母片文字樣式</a:t>
             </a:r>
           </a:p>
           <a:p>
             <a:pPr lvl="1"/>
             <a:r>
-              <a:rPr lang="zh-TW" altLang="en-US" smtClean="0"/>
+              <a:rPr lang="zh-TW" altLang="en-US"/>
               <a:t>第二層</a:t>
             </a:r>
           </a:p>
           <a:p>
             <a:pPr lvl="2"/>
             <a:r>
-              <a:rPr lang="zh-TW" altLang="en-US" smtClean="0"/>
+              <a:rPr lang="zh-TW" altLang="en-US"/>
               <a:t>第三層</a:t>
             </a:r>
           </a:p>
           <a:p>
             <a:pPr lvl="3"/>
             <a:r>
-              <a:rPr lang="zh-TW" altLang="en-US" smtClean="0"/>
+              <a:rPr lang="zh-TW" altLang="en-US"/>
               <a:t>第四層</a:t>
             </a:r>
           </a:p>
           <a:p>
             <a:pPr lvl="4"/>
             <a:r>
-              <a:rPr lang="zh-TW" altLang="en-US" smtClean="0"/>
+              <a:rPr lang="zh-TW" altLang="en-US"/>
               <a:t>第五層</a:t>
             </a:r>
-            <a:endParaRPr lang="zh-TW" altLang="en-US"/>
           </a:p>
         </p:txBody>
       </p:sp>
@@ -2688,10 +2678,9 @@
           </a:lstStyle>
           <a:p>
             <a:r>
-              <a:rPr lang="zh-TW" altLang="en-US" smtClean="0"/>
+              <a:rPr lang="zh-TW" altLang="en-US"/>
               <a:t>按一下以編輯母片標題樣式</a:t>
             </a:r>
-            <a:endParaRPr lang="zh-TW" altLang="en-US"/>
           </a:p>
         </p:txBody>
       </p:sp>
@@ -2754,7 +2743,7 @@
           <a:p>
             <a:pPr lvl="0"/>
             <a:r>
-              <a:rPr lang="zh-TW" altLang="en-US" smtClean="0"/>
+              <a:rPr lang="zh-TW" altLang="en-US"/>
               <a:t>按一下以編輯母片文字樣式</a:t>
             </a:r>
           </a:p>
@@ -2810,38 +2799,37 @@
           <a:p>
             <a:pPr lvl="0"/>
             <a:r>
-              <a:rPr lang="zh-TW" altLang="en-US" smtClean="0"/>
+              <a:rPr lang="zh-TW" altLang="en-US"/>
               <a:t>按一下以編輯母片文字樣式</a:t>
             </a:r>
           </a:p>
           <a:p>
             <a:pPr lvl="1"/>
             <a:r>
-              <a:rPr lang="zh-TW" altLang="en-US" smtClean="0"/>
+              <a:rPr lang="zh-TW" altLang="en-US"/>
               <a:t>第二層</a:t>
             </a:r>
           </a:p>
           <a:p>
             <a:pPr lvl="2"/>
             <a:r>
-              <a:rPr lang="zh-TW" altLang="en-US" smtClean="0"/>
+              <a:rPr lang="zh-TW" altLang="en-US"/>
               <a:t>第三層</a:t>
             </a:r>
           </a:p>
           <a:p>
             <a:pPr lvl="3"/>
             <a:r>
-              <a:rPr lang="zh-TW" altLang="en-US" smtClean="0"/>
+              <a:rPr lang="zh-TW" altLang="en-US"/>
               <a:t>第四層</a:t>
             </a:r>
           </a:p>
           <a:p>
             <a:pPr lvl="4"/>
             <a:r>
-              <a:rPr lang="zh-TW" altLang="en-US" smtClean="0"/>
+              <a:rPr lang="zh-TW" altLang="en-US"/>
               <a:t>第五層</a:t>
             </a:r>
-            <a:endParaRPr lang="zh-TW" altLang="en-US"/>
           </a:p>
         </p:txBody>
       </p:sp>
@@ -2904,7 +2892,7 @@
           <a:p>
             <a:pPr lvl="0"/>
             <a:r>
-              <a:rPr lang="zh-TW" altLang="en-US" smtClean="0"/>
+              <a:rPr lang="zh-TW" altLang="en-US"/>
               <a:t>按一下以編輯母片文字樣式</a:t>
             </a:r>
           </a:p>
@@ -2960,38 +2948,37 @@
           <a:p>
             <a:pPr lvl="0"/>
             <a:r>
-              <a:rPr lang="zh-TW" altLang="en-US" smtClean="0"/>
+              <a:rPr lang="zh-TW" altLang="en-US"/>
               <a:t>按一下以編輯母片文字樣式</a:t>
             </a:r>
           </a:p>
           <a:p>
             <a:pPr lvl="1"/>
             <a:r>
-              <a:rPr lang="zh-TW" altLang="en-US" smtClean="0"/>
+              <a:rPr lang="zh-TW" altLang="en-US"/>
               <a:t>第二層</a:t>
             </a:r>
           </a:p>
           <a:p>
             <a:pPr lvl="2"/>
             <a:r>
-              <a:rPr lang="zh-TW" altLang="en-US" smtClean="0"/>
+              <a:rPr lang="zh-TW" altLang="en-US"/>
               <a:t>第三層</a:t>
             </a:r>
           </a:p>
           <a:p>
             <a:pPr lvl="3"/>
             <a:r>
-              <a:rPr lang="zh-TW" altLang="en-US" smtClean="0"/>
+              <a:rPr lang="zh-TW" altLang="en-US"/>
               <a:t>第四層</a:t>
             </a:r>
           </a:p>
           <a:p>
             <a:pPr lvl="4"/>
             <a:r>
-              <a:rPr lang="zh-TW" altLang="en-US" smtClean="0"/>
+              <a:rPr lang="zh-TW" altLang="en-US"/>
               <a:t>第五層</a:t>
             </a:r>
-            <a:endParaRPr lang="zh-TW" altLang="en-US"/>
           </a:p>
         </p:txBody>
       </p:sp>
@@ -3132,10 +3119,9 @@
           <a:lstStyle/>
           <a:p>
             <a:r>
-              <a:rPr lang="zh-TW" altLang="en-US" smtClean="0"/>
+              <a:rPr lang="zh-TW" altLang="en-US"/>
               <a:t>按一下以編輯母片標題樣式</a:t>
             </a:r>
-            <a:endParaRPr lang="zh-TW" altLang="en-US"/>
           </a:p>
         </p:txBody>
       </p:sp>
@@ -3406,10 +3392,9 @@
           </a:lstStyle>
           <a:p>
             <a:r>
-              <a:rPr lang="zh-TW" altLang="en-US" smtClean="0"/>
+              <a:rPr lang="zh-TW" altLang="en-US"/>
               <a:t>按一下以編輯母片標題樣式</a:t>
             </a:r>
-            <a:endParaRPr lang="zh-TW" altLang="en-US"/>
           </a:p>
         </p:txBody>
       </p:sp>
@@ -3463,38 +3448,37 @@
           <a:p>
             <a:pPr lvl="0"/>
             <a:r>
-              <a:rPr lang="zh-TW" altLang="en-US" smtClean="0"/>
+              <a:rPr lang="zh-TW" altLang="en-US"/>
               <a:t>按一下以編輯母片文字樣式</a:t>
             </a:r>
           </a:p>
           <a:p>
             <a:pPr lvl="1"/>
             <a:r>
-              <a:rPr lang="zh-TW" altLang="en-US" smtClean="0"/>
+              <a:rPr lang="zh-TW" altLang="en-US"/>
               <a:t>第二層</a:t>
             </a:r>
           </a:p>
           <a:p>
             <a:pPr lvl="2"/>
             <a:r>
-              <a:rPr lang="zh-TW" altLang="en-US" smtClean="0"/>
+              <a:rPr lang="zh-TW" altLang="en-US"/>
               <a:t>第三層</a:t>
             </a:r>
           </a:p>
           <a:p>
             <a:pPr lvl="3"/>
             <a:r>
-              <a:rPr lang="zh-TW" altLang="en-US" smtClean="0"/>
+              <a:rPr lang="zh-TW" altLang="en-US"/>
               <a:t>第四層</a:t>
             </a:r>
           </a:p>
           <a:p>
             <a:pPr lvl="4"/>
             <a:r>
-              <a:rPr lang="zh-TW" altLang="en-US" smtClean="0"/>
+              <a:rPr lang="zh-TW" altLang="en-US"/>
               <a:t>第五層</a:t>
             </a:r>
-            <a:endParaRPr lang="zh-TW" altLang="en-US"/>
           </a:p>
         </p:txBody>
       </p:sp>
@@ -3557,7 +3541,7 @@
           <a:p>
             <a:pPr lvl="0"/>
             <a:r>
-              <a:rPr lang="zh-TW" altLang="en-US" smtClean="0"/>
+              <a:rPr lang="zh-TW" altLang="en-US"/>
               <a:t>按一下以編輯母片文字樣式</a:t>
             </a:r>
           </a:p>
@@ -3709,10 +3693,9 @@
           </a:lstStyle>
           <a:p>
             <a:r>
-              <a:rPr lang="zh-TW" altLang="en-US" smtClean="0"/>
+              <a:rPr lang="zh-TW" altLang="en-US"/>
               <a:t>按一下以編輯母片標題樣式</a:t>
             </a:r>
-            <a:endParaRPr lang="zh-TW" altLang="en-US"/>
           </a:p>
         </p:txBody>
       </p:sp>
@@ -3774,7 +3757,7 @@
           </a:lstStyle>
           <a:p>
             <a:pPr lvl="0"/>
-            <a:endParaRPr lang="zh-TW" altLang="en-US" noProof="0" smtClean="0"/>
+            <a:endParaRPr lang="zh-TW" altLang="en-US" noProof="0"/>
           </a:p>
         </p:txBody>
       </p:sp>
@@ -3837,7 +3820,7 @@
           <a:p>
             <a:pPr lvl="0"/>
             <a:r>
-              <a:rPr lang="zh-TW" altLang="en-US" smtClean="0"/>
+              <a:rPr lang="zh-TW" altLang="en-US"/>
               <a:t>按一下以編輯母片文字樣式</a:t>
             </a:r>
           </a:p>
@@ -4120,7 +4103,7 @@
             <a:pPr algn="ctr" eaLnBrk="1" hangingPunct="1">
               <a:defRPr/>
             </a:pPr>
-            <a:endParaRPr lang="zh-TW" altLang="zh-TW" sz="2400" smtClean="0"/>
+            <a:endParaRPr lang="zh-TW" altLang="zh-TW" sz="2400"/>
           </a:p>
         </p:txBody>
       </p:sp>
@@ -4280,7 +4263,7 @@
             <a:pPr algn="ctr" eaLnBrk="1" hangingPunct="1">
               <a:defRPr/>
             </a:pPr>
-            <a:endParaRPr lang="zh-TW" altLang="zh-TW" sz="2400" smtClean="0"/>
+            <a:endParaRPr lang="zh-TW" altLang="zh-TW" sz="2400"/>
           </a:p>
         </p:txBody>
       </p:sp>
@@ -4432,7 +4415,7 @@
             <a:pPr algn="ctr" eaLnBrk="1" hangingPunct="1">
               <a:defRPr/>
             </a:pPr>
-            <a:endParaRPr lang="zh-TW" altLang="zh-TW" sz="2400" smtClean="0"/>
+            <a:endParaRPr lang="zh-TW" altLang="zh-TW" sz="2400"/>
           </a:p>
         </p:txBody>
       </p:sp>
@@ -4592,7 +4575,7 @@
             <a:pPr algn="ctr" eaLnBrk="1" hangingPunct="1">
               <a:defRPr/>
             </a:pPr>
-            <a:endParaRPr lang="zh-TW" altLang="zh-TW" sz="2400" smtClean="0"/>
+            <a:endParaRPr lang="zh-TW" altLang="zh-TW" sz="2400"/>
           </a:p>
         </p:txBody>
       </p:sp>
@@ -4752,7 +4735,7 @@
             <a:pPr algn="ctr" eaLnBrk="1" hangingPunct="1">
               <a:defRPr/>
             </a:pPr>
-            <a:endParaRPr lang="zh-TW" altLang="zh-TW" sz="2400" smtClean="0"/>
+            <a:endParaRPr lang="zh-TW" altLang="zh-TW" sz="2400"/>
           </a:p>
         </p:txBody>
       </p:sp>
@@ -4904,7 +4887,7 @@
             <a:pPr algn="ctr" eaLnBrk="1" hangingPunct="1">
               <a:defRPr/>
             </a:pPr>
-            <a:endParaRPr lang="zh-TW" altLang="zh-TW" sz="2400" smtClean="0"/>
+            <a:endParaRPr lang="zh-TW" altLang="zh-TW" sz="2400"/>
           </a:p>
         </p:txBody>
       </p:sp>
@@ -5064,7 +5047,7 @@
             <a:pPr algn="ctr" eaLnBrk="1" hangingPunct="1">
               <a:defRPr/>
             </a:pPr>
-            <a:endParaRPr lang="zh-TW" altLang="zh-TW" sz="2400" smtClean="0"/>
+            <a:endParaRPr lang="zh-TW" altLang="zh-TW" sz="2400"/>
           </a:p>
         </p:txBody>
       </p:sp>
@@ -5120,7 +5103,7 @@
           <a:p>
             <a:pPr lvl="0"/>
             <a:r>
-              <a:rPr lang="zh-TW" altLang="en-US" smtClean="0"/>
+              <a:rPr lang="zh-TW" altLang="en-US"/>
               <a:t>按一下以編輯母片標題樣式</a:t>
             </a:r>
           </a:p>
@@ -5178,35 +5161,35 @@
           <a:p>
             <a:pPr lvl="0"/>
             <a:r>
-              <a:rPr lang="zh-TW" altLang="en-US" smtClean="0"/>
+              <a:rPr lang="zh-TW" altLang="en-US"/>
               <a:t>按一下以編輯母片</a:t>
             </a:r>
           </a:p>
           <a:p>
             <a:pPr lvl="1"/>
             <a:r>
-              <a:rPr lang="zh-TW" altLang="en-US" smtClean="0"/>
+              <a:rPr lang="zh-TW" altLang="en-US"/>
               <a:t>第二層</a:t>
             </a:r>
           </a:p>
           <a:p>
             <a:pPr lvl="2"/>
             <a:r>
-              <a:rPr lang="zh-TW" altLang="en-US" smtClean="0"/>
+              <a:rPr lang="zh-TW" altLang="en-US"/>
               <a:t>第三層</a:t>
             </a:r>
           </a:p>
           <a:p>
             <a:pPr lvl="3"/>
             <a:r>
-              <a:rPr lang="zh-TW" altLang="en-US" smtClean="0"/>
+              <a:rPr lang="zh-TW" altLang="en-US"/>
               <a:t>第四層</a:t>
             </a:r>
           </a:p>
           <a:p>
             <a:pPr lvl="4"/>
             <a:r>
-              <a:rPr lang="zh-TW" altLang="en-US" smtClean="0"/>
+              <a:rPr lang="zh-TW" altLang="en-US"/>
               <a:t>第五層</a:t>
             </a:r>
           </a:p>
@@ -5853,7 +5836,7 @@
           <a:p>
             <a:pPr eaLnBrk="1" hangingPunct="1"/>
             <a:r>
-              <a:rPr lang="en-US" altLang="zh-TW" smtClean="0"/>
+              <a:rPr lang="en-US" altLang="zh-TW"/>
               <a:t>Computer Organization</a:t>
             </a:r>
           </a:p>
@@ -5876,36 +5859,36 @@
           <a:p>
             <a:pPr eaLnBrk="1" hangingPunct="1"/>
             <a:r>
-              <a:rPr lang="en-US" altLang="zh-TW" smtClean="0"/>
+              <a:rPr lang="en-US" altLang="zh-TW"/>
               <a:t>Instructor: Yung-Cheng Ma (</a:t>
             </a:r>
             <a:r>
-              <a:rPr lang="zh-TW" altLang="en-US" smtClean="0"/>
+              <a:rPr lang="zh-TW" altLang="en-US"/>
               <a:t>馬詠程</a:t>
             </a:r>
             <a:r>
-              <a:rPr lang="en-US" altLang="zh-TW" smtClean="0"/>
+              <a:rPr lang="en-US" altLang="zh-TW"/>
               <a:t>)</a:t>
             </a:r>
           </a:p>
           <a:p>
             <a:pPr eaLnBrk="1" hangingPunct="1"/>
             <a:r>
-              <a:rPr lang="en-US" altLang="zh-TW" smtClean="0"/>
+              <a:rPr lang="en-US" altLang="zh-TW"/>
               <a:t>E-mail: </a:t>
             </a:r>
             <a:r>
-              <a:rPr lang="en-US" altLang="zh-TW" smtClean="0">
+              <a:rPr lang="en-US" altLang="zh-TW">
                 <a:hlinkClick r:id="rId2"/>
               </a:rPr>
               <a:t>ycma@mail.cgu.edu.tw</a:t>
             </a:r>
-            <a:endParaRPr lang="en-US" altLang="zh-TW" smtClean="0"/>
+            <a:endParaRPr lang="en-US" altLang="zh-TW"/>
           </a:p>
           <a:p>
             <a:pPr eaLnBrk="1" hangingPunct="1"/>
             <a:r>
-              <a:rPr lang="en-US" altLang="zh-TW" smtClean="0"/>
+              <a:rPr lang="en-US" altLang="zh-TW"/>
               <a:t>Tel: 3611</a:t>
             </a:r>
           </a:p>
@@ -6162,13 +6145,6 @@
   <p:clrMapOvr>
     <a:masterClrMapping/>
   </p:clrMapOvr>
-  <p:timing>
-    <p:tnLst>
-      <p:par>
-        <p:cTn id="1" dur="indefinite" restart="never" nodeType="tmRoot"/>
-      </p:par>
-    </p:tnLst>
-  </p:timing>
 </p:sld>
 </file>
 
@@ -6206,7 +6182,7 @@
           <a:p>
             <a:pPr eaLnBrk="1" hangingPunct="1"/>
             <a:r>
-              <a:rPr lang="en-US" altLang="zh-TW" smtClean="0"/>
+              <a:rPr lang="en-US" altLang="zh-TW"/>
               <a:t>The next lecture</a:t>
             </a:r>
           </a:p>
@@ -6229,21 +6205,21 @@
           <a:p>
             <a:pPr eaLnBrk="1" hangingPunct="1"/>
             <a:r>
-              <a:rPr lang="en-US" altLang="zh-TW" dirty="0" smtClean="0"/>
+              <a:rPr lang="en-US" altLang="zh-TW" dirty="0"/>
               <a:t>Recall: sequential circuit design</a:t>
             </a:r>
           </a:p>
           <a:p>
             <a:pPr lvl="1" eaLnBrk="1" hangingPunct="1"/>
             <a:r>
-              <a:rPr lang="en-US" altLang="zh-TW" dirty="0" smtClean="0"/>
+              <a:rPr lang="en-US" altLang="zh-TW" dirty="0"/>
               <a:t>Chap. 4 of our textbook</a:t>
             </a:r>
           </a:p>
           <a:p>
             <a:pPr lvl="1" eaLnBrk="1" hangingPunct="1"/>
             <a:r>
-              <a:rPr lang="en-US" altLang="zh-TW" dirty="0" smtClean="0"/>
+              <a:rPr lang="en-US" altLang="zh-TW" dirty="0"/>
               <a:t>you can also find similar material in your “digital circuit” textbook</a:t>
             </a:r>
           </a:p>
@@ -6254,13 +6230,6 @@
   <p:clrMapOvr>
     <a:masterClrMapping/>
   </p:clrMapOvr>
-  <p:timing>
-    <p:tnLst>
-      <p:par>
-        <p:cTn id="1" dur="indefinite" restart="never" nodeType="tmRoot"/>
-      </p:par>
-    </p:tnLst>
-  </p:timing>
 </p:sld>
 </file>
 
@@ -6298,7 +6267,7 @@
           <a:p>
             <a:pPr eaLnBrk="1" hangingPunct="1"/>
             <a:r>
-              <a:rPr lang="en-US" altLang="zh-TW" smtClean="0"/>
+              <a:rPr lang="en-US" altLang="zh-TW"/>
               <a:t>Quiz at the next meeting</a:t>
             </a:r>
           </a:p>
@@ -6330,12 +6299,8 @@
               </a:lnSpc>
             </a:pPr>
             <a:r>
-              <a:rPr lang="en-US" altLang="zh-TW" sz="2800" dirty="0" smtClean="0"/>
-              <a:t>9/14 </a:t>
-            </a:r>
-            <a:r>
-              <a:rPr lang="en-US" altLang="zh-TW" sz="2800" dirty="0" smtClean="0"/>
-              <a:t>(Friday) 13:10-14:00</a:t>
+              <a:rPr lang="en-US" altLang="zh-TW" sz="2800" dirty="0"/>
+              <a:t>9/16 (Monday) 10:10-12:00</a:t>
             </a:r>
           </a:p>
           <a:p>
@@ -6345,7 +6310,7 @@
               </a:lnSpc>
             </a:pPr>
             <a:r>
-              <a:rPr lang="en-US" altLang="zh-TW" sz="2800" dirty="0" smtClean="0"/>
+              <a:rPr lang="en-US" altLang="zh-TW" sz="2800" dirty="0"/>
               <a:t>Coverage: all content of digital circuit course</a:t>
             </a:r>
           </a:p>
@@ -6356,7 +6321,7 @@
               </a:lnSpc>
             </a:pPr>
             <a:r>
-              <a:rPr lang="en-US" altLang="zh-TW" sz="2400" dirty="0" smtClean="0"/>
+              <a:rPr lang="en-US" altLang="zh-TW" sz="2400" dirty="0"/>
               <a:t>draw the waveform from circuit diagram</a:t>
             </a:r>
           </a:p>
@@ -6367,7 +6332,7 @@
               </a:lnSpc>
             </a:pPr>
             <a:r>
-              <a:rPr lang="en-US" altLang="zh-TW" sz="2400" dirty="0" smtClean="0"/>
+              <a:rPr lang="en-US" altLang="zh-TW" sz="2400" dirty="0"/>
               <a:t>circuit design from functional specification</a:t>
             </a:r>
           </a:p>
@@ -6378,7 +6343,7 @@
               </a:lnSpc>
             </a:pPr>
             <a:r>
-              <a:rPr lang="en-US" altLang="zh-TW" sz="2400" dirty="0" smtClean="0">
+              <a:rPr lang="en-US" altLang="zh-TW" sz="2400" dirty="0">
                 <a:solidFill>
                   <a:srgbClr val="FF0000"/>
                 </a:solidFill>
@@ -13276,13 +13241,6 @@
   <p:clrMapOvr>
     <a:masterClrMapping/>
   </p:clrMapOvr>
-  <p:timing>
-    <p:tnLst>
-      <p:par>
-        <p:cTn id="1" dur="indefinite" restart="never" nodeType="tmRoot"/>
-      </p:par>
-    </p:tnLst>
-  </p:timing>
 </p:sld>
 </file>
 
@@ -13320,7 +13278,7 @@
           <a:p>
             <a:pPr eaLnBrk="1" hangingPunct="1"/>
             <a:r>
-              <a:rPr lang="en-US" altLang="zh-TW" dirty="0" smtClean="0"/>
+              <a:rPr lang="en-US" altLang="zh-TW" dirty="0"/>
               <a:t>Where to get my slides?</a:t>
             </a:r>
           </a:p>
@@ -13347,23 +13305,18 @@
           <a:lstStyle/>
           <a:p>
             <a:pPr eaLnBrk="1" hangingPunct="1"/>
-            <a:endParaRPr lang="en-US" altLang="zh-TW" sz="2400" dirty="0" smtClean="0"/>
+            <a:endParaRPr lang="en-US" altLang="zh-TW" sz="2400" dirty="0"/>
           </a:p>
           <a:p>
             <a:pPr eaLnBrk="1" hangingPunct="1"/>
-            <a:endParaRPr lang="en-US" altLang="zh-TW" sz="2400" dirty="0" smtClean="0"/>
+            <a:endParaRPr lang="en-US" altLang="zh-TW" sz="2400" dirty="0"/>
           </a:p>
           <a:p>
             <a:pPr eaLnBrk="1" hangingPunct="1"/>
             <a:r>
               <a:rPr lang="en-US" altLang="zh-TW" sz="2400" dirty="0"/>
-              <a:t>https://</a:t>
+              <a:t>https://github.com/CGUSystemCourses/Computer_Org-2018 </a:t>
             </a:r>
-            <a:r>
-              <a:rPr lang="en-US" altLang="zh-TW" sz="2400" dirty="0" smtClean="0"/>
-              <a:t>github.com/CGUSystemCourses/Computer_Org-2018 </a:t>
-            </a:r>
-            <a:endParaRPr lang="en-US" altLang="zh-TW" sz="2400" dirty="0" smtClean="0"/>
           </a:p>
         </p:txBody>
       </p:sp>
@@ -13372,13 +13325,6 @@
   <p:clrMapOvr>
     <a:masterClrMapping/>
   </p:clrMapOvr>
-  <p:timing>
-    <p:tnLst>
-      <p:par>
-        <p:cTn id="1" dur="indefinite" restart="never" nodeType="tmRoot"/>
-      </p:par>
-    </p:tnLst>
-  </p:timing>
 </p:sld>
 </file>
 
@@ -13416,7 +13362,7 @@
           <a:p>
             <a:pPr eaLnBrk="1" hangingPunct="1"/>
             <a:r>
-              <a:rPr lang="en-US" altLang="zh-TW" smtClean="0"/>
+              <a:rPr lang="en-US" altLang="zh-TW"/>
               <a:t>Course Materials</a:t>
             </a:r>
           </a:p>
@@ -13443,7 +13389,7 @@
               </a:lnSpc>
             </a:pPr>
             <a:r>
-              <a:rPr lang="en-US" altLang="zh-TW" smtClean="0"/>
+              <a:rPr lang="en-US" altLang="zh-TW"/>
               <a:t>Text Book:</a:t>
             </a:r>
           </a:p>
@@ -13454,7 +13400,7 @@
               </a:lnSpc>
             </a:pPr>
             <a:r>
-              <a:rPr lang="en-US" altLang="zh-TW" smtClean="0"/>
+              <a:rPr lang="en-US" altLang="zh-TW"/>
               <a:t>M. Morris Mano and Charles R. Kime, “Logic and Computer Design Fundamentals,” 5/e, Prentice-Hall, 2016</a:t>
             </a:r>
           </a:p>
@@ -13465,7 +13411,7 @@
               </a:lnSpc>
             </a:pPr>
             <a:r>
-              <a:rPr lang="en-US" altLang="zh-TW" smtClean="0"/>
+              <a:rPr lang="en-US" altLang="zh-TW"/>
               <a:t>Reference:</a:t>
             </a:r>
           </a:p>
@@ -13476,11 +13422,11 @@
               </a:lnSpc>
             </a:pPr>
             <a:r>
-              <a:rPr lang="en-US" altLang="zh-TW" smtClean="0"/>
+              <a:rPr lang="en-US" altLang="zh-TW"/>
               <a:t>your textbooks of “</a:t>
             </a:r>
             <a:r>
-              <a:rPr lang="en-US" altLang="zh-TW" smtClean="0">
+              <a:rPr lang="en-US" altLang="zh-TW">
                 <a:solidFill>
                   <a:schemeClr val="hlink"/>
                 </a:solidFill>
@@ -13488,11 +13434,11 @@
               <a:t>digital circuit</a:t>
             </a:r>
             <a:r>
-              <a:rPr lang="en-US" altLang="zh-TW" smtClean="0"/>
+              <a:rPr lang="en-US" altLang="zh-TW"/>
               <a:t>”, “</a:t>
             </a:r>
             <a:r>
-              <a:rPr lang="en-US" altLang="zh-TW" smtClean="0">
+              <a:rPr lang="en-US" altLang="zh-TW">
                 <a:solidFill>
                   <a:schemeClr val="hlink"/>
                 </a:solidFill>
@@ -13500,11 +13446,11 @@
               <a:t>physics</a:t>
             </a:r>
             <a:r>
-              <a:rPr lang="en-US" altLang="zh-TW" smtClean="0"/>
+              <a:rPr lang="en-US" altLang="zh-TW"/>
               <a:t>”, “</a:t>
             </a:r>
             <a:r>
-              <a:rPr lang="en-US" altLang="zh-TW" smtClean="0">
+              <a:rPr lang="en-US" altLang="zh-TW">
                 <a:solidFill>
                   <a:schemeClr val="hlink"/>
                 </a:solidFill>
@@ -13512,7 +13458,7 @@
               <a:t>electronics</a:t>
             </a:r>
             <a:r>
-              <a:rPr lang="en-US" altLang="zh-TW" smtClean="0"/>
+              <a:rPr lang="en-US" altLang="zh-TW"/>
               <a:t>”</a:t>
             </a:r>
           </a:p>
@@ -13523,7 +13469,7 @@
               </a:lnSpc>
             </a:pPr>
             <a:r>
-              <a:rPr lang="en-US" altLang="zh-TW" smtClean="0"/>
+              <a:rPr lang="en-US" altLang="zh-TW"/>
               <a:t>… and a lot …</a:t>
             </a:r>
           </a:p>
@@ -13534,7 +13480,7 @@
               </a:lnSpc>
             </a:pPr>
             <a:r>
-              <a:rPr lang="en-US" altLang="zh-TW" smtClean="0">
+              <a:rPr lang="en-US" altLang="zh-TW">
                 <a:solidFill>
                   <a:schemeClr val="hlink"/>
                 </a:solidFill>
@@ -13549,13 +13495,6 @@
   <p:clrMapOvr>
     <a:masterClrMapping/>
   </p:clrMapOvr>
-  <p:timing>
-    <p:tnLst>
-      <p:par>
-        <p:cTn id="1" dur="indefinite" restart="never" nodeType="tmRoot"/>
-      </p:par>
-    </p:tnLst>
-  </p:timing>
 </p:sld>
 </file>
 
@@ -13593,7 +13532,7 @@
           <a:p>
             <a:pPr eaLnBrk="1" hangingPunct="1"/>
             <a:r>
-              <a:rPr lang="en-US" altLang="zh-TW" smtClean="0"/>
+              <a:rPr lang="en-US" altLang="zh-TW"/>
               <a:t>Grading</a:t>
             </a:r>
           </a:p>
@@ -13616,21 +13555,21 @@
           <a:p>
             <a:pPr eaLnBrk="1" hangingPunct="1"/>
             <a:r>
-              <a:rPr lang="en-US" altLang="zh-TW" smtClean="0"/>
+              <a:rPr lang="en-US" altLang="zh-TW"/>
               <a:t>Quiz/Homework/Q&amp;A(40%)</a:t>
             </a:r>
           </a:p>
           <a:p>
             <a:pPr eaLnBrk="1" hangingPunct="1"/>
             <a:r>
-              <a:rPr lang="en-US" altLang="zh-TW" smtClean="0"/>
+              <a:rPr lang="en-US" altLang="zh-TW"/>
               <a:t>Mid-term Exam: 30%</a:t>
             </a:r>
           </a:p>
           <a:p>
             <a:pPr eaLnBrk="1" hangingPunct="1"/>
             <a:r>
-              <a:rPr lang="en-US" altLang="zh-TW" smtClean="0"/>
+              <a:rPr lang="en-US" altLang="zh-TW"/>
               <a:t>Final Exam: 30%</a:t>
             </a:r>
           </a:p>
@@ -13641,13 +13580,6 @@
   <p:clrMapOvr>
     <a:masterClrMapping/>
   </p:clrMapOvr>
-  <p:timing>
-    <p:tnLst>
-      <p:par>
-        <p:cTn id="1" dur="indefinite" restart="never" nodeType="tmRoot"/>
-      </p:par>
-    </p:tnLst>
-  </p:timing>
 </p:sld>
 </file>
 
@@ -13685,7 +13617,7 @@
           <a:p>
             <a:pPr eaLnBrk="1" hangingPunct="1"/>
             <a:r>
-              <a:rPr lang="en-US" altLang="zh-TW" smtClean="0"/>
+              <a:rPr lang="en-US" altLang="zh-TW"/>
               <a:t>What you will expect in this course</a:t>
             </a:r>
           </a:p>
@@ -13708,14 +13640,14 @@
           <a:p>
             <a:pPr eaLnBrk="1" hangingPunct="1"/>
             <a:r>
-              <a:rPr lang="en-US" altLang="zh-TW" sz="2800" smtClean="0"/>
+              <a:rPr lang="en-US" altLang="zh-TW" sz="2800"/>
               <a:t>You have to work harder than EE students</a:t>
             </a:r>
           </a:p>
           <a:p>
             <a:pPr eaLnBrk="1" hangingPunct="1"/>
             <a:r>
-              <a:rPr lang="en-US" altLang="zh-TW" smtClean="0">
+              <a:rPr lang="en-US" altLang="zh-TW">
                 <a:solidFill>
                   <a:srgbClr val="FF0000"/>
                 </a:solidFill>
@@ -13723,7 +13655,7 @@
               <a:t>(</a:t>
             </a:r>
             <a:r>
-              <a:rPr lang="zh-TW" altLang="en-US" smtClean="0">
+              <a:rPr lang="zh-TW" altLang="en-US">
                 <a:solidFill>
                   <a:srgbClr val="FF0000"/>
                 </a:solidFill>
@@ -13731,14 +13663,14 @@
               <a:t>比電機系還操</a:t>
             </a:r>
             <a:r>
-              <a:rPr lang="en-US" altLang="zh-TW" smtClean="0">
+              <a:rPr lang="en-US" altLang="zh-TW">
                 <a:solidFill>
                   <a:srgbClr val="FF0000"/>
                 </a:solidFill>
               </a:rPr>
               <a:t>!!!)</a:t>
             </a:r>
-            <a:endParaRPr lang="zh-TW" altLang="zh-TW" smtClean="0">
+            <a:endParaRPr lang="zh-TW" altLang="zh-TW">
               <a:solidFill>
                 <a:srgbClr val="FF0000"/>
               </a:solidFill>
@@ -13751,13 +13683,6 @@
   <p:clrMapOvr>
     <a:masterClrMapping/>
   </p:clrMapOvr>
-  <p:timing>
-    <p:tnLst>
-      <p:par>
-        <p:cTn id="1" dur="indefinite" restart="never" nodeType="tmRoot"/>
-      </p:par>
-    </p:tnLst>
-  </p:timing>
 </p:sld>
 </file>
 
@@ -13795,7 +13720,7 @@
           <a:p>
             <a:pPr eaLnBrk="1" hangingPunct="1"/>
             <a:r>
-              <a:rPr lang="en-US" altLang="zh-TW" smtClean="0"/>
+              <a:rPr lang="en-US" altLang="zh-TW"/>
               <a:t>Goals of this course</a:t>
             </a:r>
           </a:p>
@@ -13822,7 +13747,7 @@
               <a:buAutoNum type="arabicPeriod"/>
             </a:pPr>
             <a:r>
-              <a:rPr lang="en-US" altLang="zh-TW" sz="2800" smtClean="0"/>
+              <a:rPr lang="en-US" altLang="zh-TW" sz="2800"/>
               <a:t>implement a digital IC down-to gate-level</a:t>
             </a:r>
           </a:p>
@@ -13831,7 +13756,7 @@
               <a:buSzTx/>
             </a:pPr>
             <a:r>
-              <a:rPr lang="en-US" altLang="zh-TW" sz="2400" smtClean="0"/>
+              <a:rPr lang="en-US" altLang="zh-TW" sz="2400"/>
               <a:t>using RTL (register-transfer level) design</a:t>
             </a:r>
           </a:p>
@@ -13839,37 +13764,37 @@
             <a:pPr marL="1371600" lvl="2" indent="-457200" eaLnBrk="1" hangingPunct="1">
               <a:buSzTx/>
             </a:pPr>
-            <a:endParaRPr lang="en-US" altLang="zh-TW" sz="2000" smtClean="0"/>
+            <a:endParaRPr lang="en-US" altLang="zh-TW" sz="2000"/>
           </a:p>
           <a:p>
             <a:pPr marL="1371600" lvl="2" indent="-457200" eaLnBrk="1" hangingPunct="1">
               <a:buSzTx/>
             </a:pPr>
-            <a:endParaRPr lang="en-US" altLang="zh-TW" sz="2000" smtClean="0"/>
+            <a:endParaRPr lang="en-US" altLang="zh-TW" sz="2000"/>
           </a:p>
           <a:p>
             <a:pPr marL="1371600" lvl="2" indent="-457200" eaLnBrk="1" hangingPunct="1">
               <a:buSzTx/>
             </a:pPr>
-            <a:endParaRPr lang="en-US" altLang="zh-TW" sz="2000" smtClean="0"/>
+            <a:endParaRPr lang="en-US" altLang="zh-TW" sz="2000"/>
           </a:p>
           <a:p>
             <a:pPr marL="1371600" lvl="2" indent="-457200" eaLnBrk="1" hangingPunct="1">
               <a:buSzTx/>
             </a:pPr>
-            <a:endParaRPr lang="en-US" altLang="zh-TW" sz="2000" smtClean="0"/>
+            <a:endParaRPr lang="en-US" altLang="zh-TW" sz="2000"/>
           </a:p>
           <a:p>
             <a:pPr marL="1371600" lvl="2" indent="-457200" eaLnBrk="1" hangingPunct="1">
               <a:buSzTx/>
             </a:pPr>
-            <a:endParaRPr lang="en-US" altLang="zh-TW" sz="2000" smtClean="0"/>
+            <a:endParaRPr lang="en-US" altLang="zh-TW" sz="2000"/>
           </a:p>
           <a:p>
             <a:pPr marL="1371600" lvl="2" indent="-457200" eaLnBrk="1" hangingPunct="1">
               <a:buSzTx/>
             </a:pPr>
-            <a:endParaRPr lang="en-US" altLang="zh-TW" sz="2000" smtClean="0"/>
+            <a:endParaRPr lang="en-US" altLang="zh-TW" sz="2000"/>
           </a:p>
           <a:p>
             <a:pPr marL="609600" indent="-609600" eaLnBrk="1" hangingPunct="1">
@@ -13878,7 +13803,7 @@
               <a:buAutoNum type="arabicPeriod"/>
             </a:pPr>
             <a:r>
-              <a:rPr lang="en-US" altLang="zh-TW" sz="2800" smtClean="0"/>
+              <a:rPr lang="en-US" altLang="zh-TW" sz="2800"/>
               <a:t>implement hardware of a computer</a:t>
             </a:r>
           </a:p>
@@ -13887,11 +13812,11 @@
               <a:buSzTx/>
             </a:pPr>
             <a:r>
-              <a:rPr lang="en-US" altLang="zh-TW" sz="2400" smtClean="0"/>
+              <a:rPr lang="en-US" altLang="zh-TW" sz="2400"/>
               <a:t>especially </a:t>
             </a:r>
             <a:r>
-              <a:rPr lang="en-US" altLang="zh-TW" sz="2400" smtClean="0">
+              <a:rPr lang="en-US" altLang="zh-TW" sz="2400">
                 <a:solidFill>
                   <a:schemeClr val="hlink"/>
                 </a:solidFill>
@@ -14529,13 +14454,6 @@
   <p:clrMapOvr>
     <a:masterClrMapping/>
   </p:clrMapOvr>
-  <p:timing>
-    <p:tnLst>
-      <p:par>
-        <p:cTn id="1" dur="indefinite" restart="never" nodeType="tmRoot"/>
-      </p:par>
-    </p:tnLst>
-  </p:timing>
 </p:sld>
 </file>
 
@@ -14573,7 +14491,7 @@
           <a:p>
             <a:pPr eaLnBrk="1" hangingPunct="1"/>
             <a:r>
-              <a:rPr lang="en-US" altLang="zh-TW" smtClean="0"/>
+              <a:rPr lang="en-US" altLang="zh-TW"/>
               <a:t>Course Outline</a:t>
             </a:r>
           </a:p>
@@ -14601,56 +14519,56 @@
           <a:p>
             <a:pPr eaLnBrk="1" hangingPunct="1"/>
             <a:r>
-              <a:rPr lang="en-US" altLang="zh-TW" sz="2800" dirty="0" smtClean="0"/>
+              <a:rPr lang="en-US" altLang="zh-TW" sz="2800" dirty="0"/>
               <a:t>Part 0: recall from “digital circuit course”</a:t>
             </a:r>
           </a:p>
           <a:p>
             <a:pPr lvl="1" eaLnBrk="1" hangingPunct="1"/>
             <a:r>
-              <a:rPr lang="en-US" altLang="zh-TW" sz="2400" dirty="0" smtClean="0"/>
+              <a:rPr lang="en-US" altLang="zh-TW" sz="2400" dirty="0"/>
               <a:t>Chap. 4: sequential circuit</a:t>
             </a:r>
           </a:p>
           <a:p>
             <a:pPr eaLnBrk="1" hangingPunct="1"/>
             <a:r>
-              <a:rPr lang="en-US" altLang="zh-TW" sz="2800" dirty="0" smtClean="0"/>
+              <a:rPr lang="en-US" altLang="zh-TW" sz="2800" dirty="0"/>
               <a:t>Part 0.5: basics of VLSI design</a:t>
             </a:r>
           </a:p>
           <a:p>
             <a:pPr lvl="1" eaLnBrk="1" hangingPunct="1"/>
             <a:r>
-              <a:rPr lang="en-US" altLang="zh-TW" sz="2400" dirty="0" smtClean="0"/>
+              <a:rPr lang="en-US" altLang="zh-TW" sz="2400" dirty="0"/>
               <a:t>Chap. 5</a:t>
             </a:r>
           </a:p>
           <a:p>
             <a:pPr eaLnBrk="1" hangingPunct="1"/>
             <a:r>
-              <a:rPr lang="en-US" altLang="zh-TW" sz="2800" dirty="0" smtClean="0"/>
+              <a:rPr lang="en-US" altLang="zh-TW" sz="2800" dirty="0"/>
               <a:t>Part 1: RTL (register transfer level) design</a:t>
             </a:r>
           </a:p>
           <a:p>
             <a:pPr lvl="1" eaLnBrk="1" hangingPunct="1"/>
             <a:r>
-              <a:rPr lang="en-US" altLang="zh-TW" sz="2400" dirty="0" smtClean="0"/>
+              <a:rPr lang="en-US" altLang="zh-TW" sz="2400" dirty="0"/>
               <a:t>Chap. 6</a:t>
             </a:r>
           </a:p>
           <a:p>
             <a:pPr eaLnBrk="1" hangingPunct="1"/>
             <a:r>
-              <a:rPr lang="en-US" altLang="zh-TW" sz="2800" dirty="0" smtClean="0"/>
+              <a:rPr lang="en-US" altLang="zh-TW" sz="2800" dirty="0"/>
               <a:t>Part 2: CPU design</a:t>
             </a:r>
           </a:p>
           <a:p>
             <a:pPr lvl="1" eaLnBrk="1" hangingPunct="1"/>
             <a:r>
-              <a:rPr lang="en-US" altLang="zh-TW" sz="2400" dirty="0" smtClean="0"/>
+              <a:rPr lang="en-US" altLang="zh-TW" sz="2400" dirty="0"/>
               <a:t>Chap. 8</a:t>
             </a:r>
           </a:p>
@@ -14661,13 +14579,6 @@
   <p:clrMapOvr>
     <a:masterClrMapping/>
   </p:clrMapOvr>
-  <p:timing>
-    <p:tnLst>
-      <p:par>
-        <p:cTn id="1" dur="indefinite" restart="never" nodeType="tmRoot"/>
-      </p:par>
-    </p:tnLst>
-  </p:timing>
 </p:sld>
 </file>
 
@@ -14705,7 +14616,7 @@
           <a:p>
             <a:pPr eaLnBrk="1" hangingPunct="1"/>
             <a:r>
-              <a:rPr lang="en-US" altLang="zh-TW" smtClean="0"/>
+              <a:rPr lang="en-US" altLang="zh-TW"/>
               <a:t>VLSI design flow</a:t>
             </a:r>
           </a:p>
@@ -17715,13 +17626,8 @@
             <a:pPr lvl="1" eaLnBrk="1" hangingPunct="1"/>
             <a:r>
               <a:rPr lang="en-US" altLang="zh-TW" sz="2400" dirty="0"/>
-              <a:t>electronics </a:t>
+              <a:t>electronics (will be mentioned if necessary)</a:t>
             </a:r>
-            <a:r>
-              <a:rPr lang="en-US" altLang="zh-TW" sz="2400" dirty="0" smtClean="0"/>
-              <a:t>(will be mentioned if necessary)</a:t>
-            </a:r>
-            <a:endParaRPr lang="en-US" altLang="zh-TW" sz="2400" dirty="0"/>
           </a:p>
         </p:txBody>
       </p:sp>
@@ -17730,13 +17636,6 @@
   <p:clrMapOvr>
     <a:masterClrMapping/>
   </p:clrMapOvr>
-  <p:timing>
-    <p:tnLst>
-      <p:par>
-        <p:cTn id="1" dur="indefinite" restart="never" nodeType="tmRoot"/>
-      </p:par>
-    </p:tnLst>
-  </p:timing>
 </p:sld>
 </file>
 
@@ -17774,7 +17673,7 @@
           <a:p>
             <a:pPr eaLnBrk="1" hangingPunct="1"/>
             <a:r>
-              <a:rPr lang="en-US" altLang="zh-TW" smtClean="0"/>
+              <a:rPr lang="en-US" altLang="zh-TW"/>
               <a:t>Course Requirements</a:t>
             </a:r>
           </a:p>
@@ -17801,7 +17700,7 @@
               </a:lnSpc>
             </a:pPr>
             <a:r>
-              <a:rPr lang="en-US" altLang="zh-TW" sz="2800" smtClean="0"/>
+              <a:rPr lang="en-US" altLang="zh-TW" sz="2800"/>
               <a:t>In-Class Exercises:</a:t>
             </a:r>
           </a:p>
@@ -17812,7 +17711,7 @@
               </a:lnSpc>
             </a:pPr>
             <a:r>
-              <a:rPr lang="en-US" altLang="zh-TW" sz="2400" smtClean="0"/>
+              <a:rPr lang="en-US" altLang="zh-TW" sz="2400"/>
               <a:t>quiz may be given without inform you before the class</a:t>
             </a:r>
           </a:p>
@@ -17823,7 +17722,7 @@
               </a:lnSpc>
             </a:pPr>
             <a:r>
-              <a:rPr lang="en-US" altLang="zh-TW" sz="2400" smtClean="0"/>
+              <a:rPr lang="en-US" altLang="zh-TW" sz="2400"/>
               <a:t>In-class Q&amp;A will be part of your grading</a:t>
             </a:r>
           </a:p>
@@ -17834,7 +17733,7 @@
               </a:lnSpc>
             </a:pPr>
             <a:r>
-              <a:rPr lang="en-US" altLang="zh-TW" sz="2800" smtClean="0"/>
+              <a:rPr lang="en-US" altLang="zh-TW" sz="2800"/>
               <a:t>What you will find in the exam: things you never learned in the class/textbooks</a:t>
             </a:r>
           </a:p>
@@ -17845,7 +17744,7 @@
               </a:lnSpc>
             </a:pPr>
             <a:r>
-              <a:rPr lang="en-US" altLang="zh-TW" sz="2400" smtClean="0"/>
+              <a:rPr lang="en-US" altLang="zh-TW" sz="2400"/>
               <a:t>training your problem-solving ability is my focus!</a:t>
             </a:r>
           </a:p>
@@ -17856,7 +17755,7 @@
               </a:lnSpc>
             </a:pPr>
             <a:r>
-              <a:rPr lang="en-US" altLang="zh-TW" sz="2800" smtClean="0"/>
+              <a:rPr lang="en-US" altLang="zh-TW" sz="2800"/>
               <a:t>Learn by yourself!</a:t>
             </a:r>
           </a:p>
@@ -17867,7 +17766,7 @@
               </a:lnSpc>
             </a:pPr>
             <a:r>
-              <a:rPr lang="en-US" altLang="zh-TW" sz="2400" smtClean="0"/>
+              <a:rPr lang="en-US" altLang="zh-TW" sz="2400"/>
               <a:t>at least 9 hours per week! (exclude the class/lab hours)</a:t>
             </a:r>
           </a:p>
@@ -17877,7 +17776,7 @@
                 <a:spcPct val="80000"/>
               </a:lnSpc>
             </a:pPr>
-            <a:endParaRPr lang="en-US" altLang="zh-TW" sz="2800" smtClean="0"/>
+            <a:endParaRPr lang="en-US" altLang="zh-TW" sz="2800"/>
           </a:p>
           <a:p>
             <a:pPr eaLnBrk="1" hangingPunct="1">
@@ -17885,7 +17784,7 @@
                 <a:spcPct val="80000"/>
               </a:lnSpc>
             </a:pPr>
-            <a:endParaRPr lang="en-US" altLang="zh-TW" sz="2800" smtClean="0"/>
+            <a:endParaRPr lang="en-US" altLang="zh-TW" sz="2800"/>
           </a:p>
         </p:txBody>
       </p:sp>

</xml_diff>